<commit_message>
feat: update current presentation on iteration 4; add new diagram and other slides
</commit_message>
<xml_diff>
--- a/forEdits/Iter4/Iter4_1.pptx
+++ b/forEdits/Iter4/Iter4_1.pptx
@@ -10,6 +10,9 @@
     <p:sldId id="257" r:id="rId4"/>
     <p:sldId id="258" r:id="rId5"/>
     <p:sldId id="259" r:id="rId6"/>
+    <p:sldId id="261" r:id="rId7"/>
+    <p:sldId id="262" r:id="rId8"/>
+    <p:sldId id="263" r:id="rId9"/>
   </p:sldIdLst>
   <p:sldSz cx="12192000" cy="6858000"/>
   <p:notesSz cx="6858000" cy="9144000"/>
@@ -3927,10 +3930,9 @@
           <a:lstStyle/>
           <a:p>
             <a:r>
-              <a:rPr lang="ru-RU" dirty="0" smtClean="0"/>
+              <a:rPr lang="ru-RU" dirty="0"/>
               <a:t>Диаграмма связи внешних сущностей и внешних систем</a:t>
             </a:r>
-            <a:endParaRPr lang="ru-RU" dirty="0"/>
           </a:p>
         </p:txBody>
       </p:sp>
@@ -4080,10 +4082,9 @@
                     <a:lstStyle/>
                     <a:p>
                       <a:r>
-                        <a:rPr lang="ru-RU" dirty="0" smtClean="0"/>
+                        <a:rPr lang="ru-RU" dirty="0"/>
                         <a:t>Система</a:t>
                       </a:r>
-                      <a:endParaRPr lang="ru-RU" dirty="0"/>
                     </a:p>
                   </a:txBody>
                   <a:tcPr/>
@@ -4094,10 +4095,9 @@
                     <a:lstStyle/>
                     <a:p>
                       <a:r>
-                        <a:rPr lang="ru-RU" dirty="0" smtClean="0"/>
+                        <a:rPr lang="ru-RU" dirty="0"/>
                         <a:t>Способ обмена</a:t>
                       </a:r>
-                      <a:endParaRPr lang="ru-RU" dirty="0"/>
                     </a:p>
                   </a:txBody>
                   <a:tcPr/>
@@ -4108,10 +4108,9 @@
                     <a:lstStyle/>
                     <a:p>
                       <a:r>
-                        <a:rPr lang="ru-RU" dirty="0" smtClean="0"/>
+                        <a:rPr lang="ru-RU" dirty="0"/>
                         <a:t>Формат</a:t>
                       </a:r>
-                      <a:endParaRPr lang="ru-RU" dirty="0"/>
                     </a:p>
                   </a:txBody>
                   <a:tcPr/>
@@ -4122,10 +4121,9 @@
                     <a:lstStyle/>
                     <a:p>
                       <a:r>
-                        <a:rPr lang="ru-RU" dirty="0" smtClean="0"/>
+                        <a:rPr lang="ru-RU" dirty="0"/>
                         <a:t>Объем данных</a:t>
                       </a:r>
-                      <a:endParaRPr lang="ru-RU" dirty="0"/>
                     </a:p>
                   </a:txBody>
                   <a:tcPr/>
@@ -4136,10 +4134,9 @@
                     <a:lstStyle/>
                     <a:p>
                       <a:r>
-                        <a:rPr lang="ru-RU" dirty="0" smtClean="0"/>
+                        <a:rPr lang="ru-RU" dirty="0"/>
                         <a:t>Нагрузка</a:t>
                       </a:r>
-                      <a:endParaRPr lang="ru-RU" dirty="0"/>
                     </a:p>
                   </a:txBody>
                   <a:tcPr/>
@@ -4157,10 +4154,9 @@
                     <a:lstStyle/>
                     <a:p>
                       <a:r>
-                        <a:rPr lang="ru-RU" dirty="0" smtClean="0"/>
+                        <a:rPr lang="ru-RU" dirty="0"/>
                         <a:t>Источники</a:t>
                       </a:r>
-                      <a:endParaRPr lang="ru-RU" dirty="0"/>
                     </a:p>
                   </a:txBody>
                   <a:tcPr/>
@@ -4171,15 +4167,15 @@
                     <a:lstStyle/>
                     <a:p>
                       <a:r>
-                        <a:rPr lang="ru-RU" dirty="0" smtClean="0"/>
+                        <a:rPr lang="ru-RU" dirty="0"/>
                         <a:t>Асинхронный (</a:t>
                       </a:r>
                       <a:r>
-                        <a:rPr lang="en-US" dirty="0" err="1" smtClean="0"/>
+                        <a:rPr lang="en-US" dirty="0" err="1"/>
                         <a:t>RabbitMQ</a:t>
                       </a:r>
                       <a:r>
-                        <a:rPr lang="en-US" dirty="0" smtClean="0"/>
+                        <a:rPr lang="en-US" dirty="0"/>
                         <a:t>)</a:t>
                       </a:r>
                       <a:endParaRPr lang="ru-RU" dirty="0"/>
@@ -4193,7 +4189,7 @@
                     <a:lstStyle/>
                     <a:p>
                       <a:r>
-                        <a:rPr lang="en-US" dirty="0" smtClean="0"/>
+                        <a:rPr lang="en-US" dirty="0"/>
                         <a:t>JSON</a:t>
                       </a:r>
                       <a:endParaRPr lang="ru-RU" dirty="0"/>
@@ -4207,29 +4203,28 @@
                     <a:lstStyle/>
                     <a:p>
                       <a:r>
-                        <a:rPr lang="en-US" dirty="0" smtClean="0"/>
+                        <a:rPr lang="en-US" dirty="0"/>
                         <a:t>10-</a:t>
                       </a:r>
                       <a:r>
-                        <a:rPr lang="ru-RU" dirty="0" smtClean="0"/>
+                        <a:rPr lang="ru-RU" dirty="0"/>
                         <a:t>5</a:t>
                       </a:r>
                       <a:r>
-                        <a:rPr lang="en-US" dirty="0" smtClean="0"/>
+                        <a:rPr lang="en-US" dirty="0"/>
                         <a:t>0</a:t>
                       </a:r>
-                      <a:endParaRPr lang="ru-RU" dirty="0" smtClean="0"/>
+                      <a:endParaRPr lang="ru-RU" dirty="0"/>
                     </a:p>
                     <a:p>
                       <a:r>
-                        <a:rPr lang="en-US" dirty="0" smtClean="0"/>
+                        <a:rPr lang="en-US" dirty="0"/>
                         <a:t>KB/</a:t>
                       </a:r>
                       <a:r>
-                        <a:rPr lang="ru-RU" dirty="0" smtClean="0"/>
+                        <a:rPr lang="ru-RU" dirty="0"/>
                         <a:t>новость</a:t>
                       </a:r>
-                      <a:endParaRPr lang="ru-RU" dirty="0"/>
                     </a:p>
                   </a:txBody>
                   <a:tcPr/>
@@ -4240,10 +4235,9 @@
                     <a:lstStyle/>
                     <a:p>
                       <a:r>
-                        <a:rPr lang="ru-RU" dirty="0" smtClean="0"/>
+                        <a:rPr lang="ru-RU" dirty="0"/>
                         <a:t>1000/час (пик утром)</a:t>
                       </a:r>
-                      <a:endParaRPr lang="ru-RU" dirty="0"/>
                     </a:p>
                   </a:txBody>
                   <a:tcPr/>
@@ -4261,7 +4255,7 @@
                     <a:lstStyle/>
                     <a:p>
                       <a:r>
-                        <a:rPr lang="en-US" dirty="0" smtClean="0"/>
+                        <a:rPr lang="en-US" dirty="0"/>
                         <a:t>Telegram</a:t>
                       </a:r>
                       <a:endParaRPr lang="ru-RU" dirty="0"/>
@@ -4275,15 +4269,15 @@
                     <a:lstStyle/>
                     <a:p>
                       <a:r>
-                        <a:rPr lang="ru-RU" dirty="0" smtClean="0"/>
+                        <a:rPr lang="ru-RU" dirty="0"/>
                         <a:t>Синхронный (</a:t>
                       </a:r>
                       <a:r>
-                        <a:rPr lang="en-US" dirty="0" err="1" smtClean="0"/>
+                        <a:rPr lang="en-US" dirty="0" err="1"/>
                         <a:t>Webhooks</a:t>
                       </a:r>
                       <a:r>
-                        <a:rPr lang="en-US" dirty="0" smtClean="0"/>
+                        <a:rPr lang="en-US" dirty="0"/>
                         <a:t>)</a:t>
                       </a:r>
                       <a:endParaRPr lang="ru-RU" dirty="0"/>
@@ -4297,7 +4291,7 @@
                     <a:lstStyle/>
                     <a:p>
                       <a:r>
-                        <a:rPr lang="en-US" dirty="0" smtClean="0"/>
+                        <a:rPr lang="en-US" dirty="0"/>
                         <a:t>JSON</a:t>
                       </a:r>
                       <a:endParaRPr lang="ru-RU" dirty="0"/>
@@ -4311,21 +4305,20 @@
                     <a:lstStyle/>
                     <a:p>
                       <a:r>
-                        <a:rPr lang="en-US" dirty="0" smtClean="0"/>
+                        <a:rPr lang="en-US" dirty="0"/>
                         <a:t>1-5</a:t>
                       </a:r>
-                      <a:endParaRPr lang="ru-RU" dirty="0" smtClean="0"/>
+                      <a:endParaRPr lang="ru-RU" dirty="0"/>
                     </a:p>
                     <a:p>
                       <a:r>
-                        <a:rPr lang="en-US" dirty="0" smtClean="0"/>
+                        <a:rPr lang="en-US" dirty="0"/>
                         <a:t>KB/</a:t>
                       </a:r>
                       <a:r>
-                        <a:rPr lang="ru-RU" dirty="0" smtClean="0"/>
+                        <a:rPr lang="ru-RU" dirty="0"/>
                         <a:t>уведомление</a:t>
                       </a:r>
-                      <a:endParaRPr lang="ru-RU" dirty="0"/>
                     </a:p>
                   </a:txBody>
                   <a:tcPr/>
@@ -4336,10 +4329,9 @@
                     <a:lstStyle/>
                     <a:p>
                       <a:r>
-                        <a:rPr lang="ru-RU" dirty="0" smtClean="0"/>
+                        <a:rPr lang="ru-RU" dirty="0"/>
                         <a:t>500/день</a:t>
                       </a:r>
-                      <a:endParaRPr lang="ru-RU" dirty="0"/>
                     </a:p>
                   </a:txBody>
                   <a:tcPr/>
@@ -4357,7 +4349,7 @@
                     <a:lstStyle/>
                     <a:p>
                       <a:r>
-                        <a:rPr lang="en-US" dirty="0" smtClean="0"/>
+                        <a:rPr lang="en-US" dirty="0"/>
                         <a:t>Stripe</a:t>
                       </a:r>
                       <a:endParaRPr lang="ru-RU" dirty="0"/>
@@ -4371,11 +4363,11 @@
                     <a:lstStyle/>
                     <a:p>
                       <a:r>
-                        <a:rPr lang="ru-RU" dirty="0" smtClean="0"/>
+                        <a:rPr lang="ru-RU" dirty="0"/>
                         <a:t>Синхронный (</a:t>
                       </a:r>
                       <a:r>
-                        <a:rPr lang="en-US" dirty="0" smtClean="0"/>
+                        <a:rPr lang="en-US" dirty="0"/>
                         <a:t>REST)</a:t>
                       </a:r>
                       <a:endParaRPr lang="ru-RU" dirty="0"/>
@@ -4389,7 +4381,7 @@
                     <a:lstStyle/>
                     <a:p>
                       <a:r>
-                        <a:rPr lang="en-US" dirty="0" smtClean="0"/>
+                        <a:rPr lang="en-US" dirty="0"/>
                         <a:t>JSON</a:t>
                       </a:r>
                       <a:endParaRPr lang="ru-RU" dirty="0"/>
@@ -4403,21 +4395,20 @@
                     <a:lstStyle/>
                     <a:p>
                       <a:r>
-                        <a:rPr lang="en-US" dirty="0" smtClean="0"/>
+                        <a:rPr lang="en-US" dirty="0"/>
                         <a:t>2-10</a:t>
                       </a:r>
-                      <a:endParaRPr lang="ru-RU" dirty="0" smtClean="0"/>
+                      <a:endParaRPr lang="ru-RU" dirty="0"/>
                     </a:p>
                     <a:p>
                       <a:r>
-                        <a:rPr lang="en-US" dirty="0" smtClean="0"/>
+                        <a:rPr lang="en-US" dirty="0"/>
                         <a:t>KB/</a:t>
                       </a:r>
                       <a:r>
-                        <a:rPr lang="ru-RU" dirty="0" smtClean="0"/>
+                        <a:rPr lang="ru-RU" dirty="0"/>
                         <a:t>транзакция</a:t>
                       </a:r>
-                      <a:endParaRPr lang="ru-RU" dirty="0"/>
                     </a:p>
                   </a:txBody>
                   <a:tcPr/>
@@ -4428,10 +4419,9 @@
                     <a:lstStyle/>
                     <a:p>
                       <a:r>
-                        <a:rPr lang="ru-RU" dirty="0" smtClean="0"/>
+                        <a:rPr lang="ru-RU" dirty="0"/>
                         <a:t>50/день</a:t>
                       </a:r>
-                      <a:endParaRPr lang="ru-RU" dirty="0"/>
                     </a:p>
                   </a:txBody>
                   <a:tcPr/>
@@ -4449,10 +4439,9 @@
                     <a:lstStyle/>
                     <a:p>
                       <a:r>
-                        <a:rPr lang="ru-RU" dirty="0" smtClean="0"/>
+                        <a:rPr lang="ru-RU" dirty="0"/>
                         <a:t>Клиенты</a:t>
                       </a:r>
-                      <a:endParaRPr lang="ru-RU" dirty="0"/>
                     </a:p>
                   </a:txBody>
                   <a:tcPr/>
@@ -4463,15 +4452,15 @@
                     <a:lstStyle/>
                     <a:p>
                       <a:r>
-                        <a:rPr lang="ru-RU" dirty="0" smtClean="0"/>
+                        <a:rPr lang="ru-RU" dirty="0"/>
                         <a:t>Синхронный (</a:t>
                       </a:r>
                       <a:r>
-                        <a:rPr lang="en-US" dirty="0" err="1" smtClean="0"/>
+                        <a:rPr lang="en-US" dirty="0" err="1"/>
                         <a:t>GraphQL</a:t>
                       </a:r>
                       <a:r>
-                        <a:rPr lang="en-US" dirty="0" smtClean="0"/>
+                        <a:rPr lang="en-US" dirty="0"/>
                         <a:t>)</a:t>
                       </a:r>
                       <a:endParaRPr lang="ru-RU" dirty="0"/>
@@ -4485,11 +4474,11 @@
                     <a:lstStyle/>
                     <a:p>
                       <a:r>
-                        <a:rPr lang="en-US" dirty="0" smtClean="0"/>
+                        <a:rPr lang="en-US" dirty="0"/>
                         <a:t>JSON/</a:t>
                       </a:r>
                       <a:r>
-                        <a:rPr lang="en-US" dirty="0" err="1" smtClean="0"/>
+                        <a:rPr lang="en-US" dirty="0" err="1"/>
                         <a:t>gRPC</a:t>
                       </a:r>
                       <a:endParaRPr lang="ru-RU" dirty="0"/>
@@ -4503,21 +4492,20 @@
                     <a:lstStyle/>
                     <a:p>
                       <a:r>
-                        <a:rPr lang="en-US" dirty="0" smtClean="0"/>
+                        <a:rPr lang="en-US" dirty="0"/>
                         <a:t>5-100</a:t>
                       </a:r>
-                      <a:endParaRPr lang="ru-RU" dirty="0" smtClean="0"/>
+                      <a:endParaRPr lang="ru-RU" dirty="0"/>
                     </a:p>
                     <a:p>
                       <a:r>
-                        <a:rPr lang="en-US" dirty="0" smtClean="0"/>
+                        <a:rPr lang="en-US" dirty="0"/>
                         <a:t>KB/</a:t>
                       </a:r>
                       <a:r>
-                        <a:rPr lang="ru-RU" dirty="0" smtClean="0"/>
+                        <a:rPr lang="ru-RU" dirty="0"/>
                         <a:t>запрос</a:t>
                       </a:r>
-                      <a:endParaRPr lang="ru-RU" dirty="0"/>
                     </a:p>
                   </a:txBody>
                   <a:tcPr/>
@@ -4528,7 +4516,7 @@
                     <a:lstStyle/>
                     <a:p>
                       <a:r>
-                        <a:rPr lang="en-US" dirty="0" smtClean="0"/>
+                        <a:rPr lang="en-US" dirty="0"/>
                         <a:t>100 RPS</a:t>
                       </a:r>
                       <a:endParaRPr lang="ru-RU" dirty="0"/>
@@ -4639,29 +4627,42 @@
           <a:bodyPr/>
           <a:lstStyle/>
           <a:p>
-            <a:endParaRPr lang="ru-RU"/>
-          </a:p>
-        </p:txBody>
-      </p:sp>
-      <p:sp>
-        <p:nvSpPr>
-          <p:cNvPr id="3" name="Объект 2"/>
-          <p:cNvSpPr>
-            <a:spLocks noGrp="1"/>
-          </p:cNvSpPr>
+            <a:r>
+              <a:rPr lang="ru-RU" dirty="0"/>
+              <a:t>Архитектура логическая (контейнеры)</a:t>
+            </a:r>
+          </a:p>
+        </p:txBody>
+      </p:sp>
+      <p:pic>
+        <p:nvPicPr>
+          <p:cNvPr id="6" name="Объект 5">
+            <a:extLst>
+              <a:ext uri="{FF2B5EF4-FFF2-40B4-BE49-F238E27FC236}">
+                <a16:creationId xmlns:a16="http://schemas.microsoft.com/office/drawing/2014/main" id="{88BCCC47-CF20-B424-4842-AF17D492E691}"/>
+              </a:ext>
+            </a:extLst>
+          </p:cNvPr>
+          <p:cNvPicPr>
+            <a:picLocks noGrp="1" noChangeAspect="1"/>
+          </p:cNvPicPr>
           <p:nvPr>
             <p:ph idx="1"/>
           </p:nvPr>
-        </p:nvSpPr>
-        <p:spPr/>
-        <p:txBody>
-          <a:bodyPr/>
-          <a:lstStyle/>
-          <a:p>
-            <a:endParaRPr lang="ru-RU"/>
-          </a:p>
-        </p:txBody>
-      </p:sp>
+        </p:nvPicPr>
+        <p:blipFill>
+          <a:blip r:embed="rId2"/>
+          <a:stretch>
+            <a:fillRect/>
+          </a:stretch>
+        </p:blipFill>
+        <p:spPr>
+          <a:xfrm>
+            <a:off x="3562971" y="1846263"/>
+            <a:ext cx="5126384" cy="4022725"/>
+          </a:xfrm>
+        </p:spPr>
+      </p:pic>
     </p:spTree>
     <p:extLst>
       <p:ext uri="{BB962C8B-B14F-4D97-AF65-F5344CB8AC3E}">
@@ -4707,7 +4708,10 @@
           <a:bodyPr/>
           <a:lstStyle/>
           <a:p>
-            <a:endParaRPr lang="ru-RU"/>
+            <a:r>
+              <a:rPr lang="ru-RU" dirty="0"/>
+              <a:t>Ключевые компоненты:</a:t>
+            </a:r>
           </a:p>
         </p:txBody>
       </p:sp>
@@ -4723,10 +4727,533 @@
         </p:nvSpPr>
         <p:spPr/>
         <p:txBody>
-          <a:bodyPr/>
+          <a:bodyPr>
+            <a:normAutofit/>
+          </a:bodyPr>
           <a:lstStyle/>
           <a:p>
-            <a:endParaRPr lang="ru-RU"/>
+            <a:pPr algn="l">
+              <a:lnSpc>
+                <a:spcPts val="2143"/>
+              </a:lnSpc>
+              <a:spcBef>
+                <a:spcPts val="1029"/>
+              </a:spcBef>
+              <a:spcAft>
+                <a:spcPts val="300"/>
+              </a:spcAft>
+              <a:buFont typeface="+mj-lt"/>
+              <a:buAutoNum type="arabicPeriod"/>
+            </a:pPr>
+            <a:r>
+              <a:rPr lang="en-US" b="1" i="0" dirty="0">
+                <a:solidFill>
+                  <a:srgbClr val="404040"/>
+                </a:solidFill>
+                <a:effectLst/>
+                <a:latin typeface="Times New Roman" panose="02020603050405020304" pitchFamily="18" charset="0"/>
+                <a:cs typeface="Times New Roman" panose="02020603050405020304" pitchFamily="18" charset="0"/>
+              </a:rPr>
+              <a:t> </a:t>
+            </a:r>
+            <a:r>
+              <a:rPr lang="ru-RU" b="1" i="0" dirty="0">
+                <a:solidFill>
+                  <a:srgbClr val="404040"/>
+                </a:solidFill>
+                <a:effectLst/>
+                <a:latin typeface="Times New Roman" panose="02020603050405020304" pitchFamily="18" charset="0"/>
+                <a:cs typeface="Times New Roman" panose="02020603050405020304" pitchFamily="18" charset="0"/>
+              </a:rPr>
+              <a:t>API</a:t>
+            </a:r>
+            <a:r>
+              <a:rPr lang="ru-RU" b="0" i="0" dirty="0">
+                <a:solidFill>
+                  <a:srgbClr val="404040"/>
+                </a:solidFill>
+                <a:effectLst/>
+                <a:latin typeface="Times New Roman" panose="02020603050405020304" pitchFamily="18" charset="0"/>
+                <a:cs typeface="Times New Roman" panose="02020603050405020304" pitchFamily="18" charset="0"/>
+              </a:rPr>
+              <a:t>:</a:t>
+            </a:r>
+            <a:r>
+              <a:rPr lang="en-US" b="0" i="0" dirty="0">
+                <a:solidFill>
+                  <a:srgbClr val="404040"/>
+                </a:solidFill>
+                <a:effectLst/>
+                <a:latin typeface="Times New Roman" panose="02020603050405020304" pitchFamily="18" charset="0"/>
+                <a:cs typeface="Times New Roman" panose="02020603050405020304" pitchFamily="18" charset="0"/>
+              </a:rPr>
+              <a:t> </a:t>
+            </a:r>
+            <a:r>
+              <a:rPr lang="ru-RU" b="0" i="0" dirty="0">
+                <a:solidFill>
+                  <a:srgbClr val="404040"/>
+                </a:solidFill>
+                <a:effectLst/>
+                <a:latin typeface="Times New Roman" panose="02020603050405020304" pitchFamily="18" charset="0"/>
+                <a:cs typeface="Times New Roman" panose="02020603050405020304" pitchFamily="18" charset="0"/>
+              </a:rPr>
+              <a:t>Единая точка входа</a:t>
+            </a:r>
+            <a:r>
+              <a:rPr lang="en-US" dirty="0">
+                <a:solidFill>
+                  <a:srgbClr val="404040"/>
+                </a:solidFill>
+                <a:latin typeface="Times New Roman" panose="02020603050405020304" pitchFamily="18" charset="0"/>
+                <a:cs typeface="Times New Roman" panose="02020603050405020304" pitchFamily="18" charset="0"/>
+              </a:rPr>
+              <a:t>; </a:t>
+            </a:r>
+            <a:r>
+              <a:rPr lang="ru-RU" b="0" i="0" dirty="0">
+                <a:solidFill>
+                  <a:srgbClr val="404040"/>
+                </a:solidFill>
+                <a:effectLst/>
+                <a:latin typeface="Times New Roman" panose="02020603050405020304" pitchFamily="18" charset="0"/>
+                <a:cs typeface="Times New Roman" panose="02020603050405020304" pitchFamily="18" charset="0"/>
+              </a:rPr>
+              <a:t>Балансировка нагрузки</a:t>
+            </a:r>
+            <a:r>
+              <a:rPr lang="en-US" b="0" i="0" dirty="0">
+                <a:solidFill>
+                  <a:srgbClr val="404040"/>
+                </a:solidFill>
+                <a:effectLst/>
+                <a:latin typeface="Times New Roman" panose="02020603050405020304" pitchFamily="18" charset="0"/>
+                <a:cs typeface="Times New Roman" panose="02020603050405020304" pitchFamily="18" charset="0"/>
+              </a:rPr>
+              <a:t>; </a:t>
+            </a:r>
+            <a:r>
+              <a:rPr lang="ru-RU" b="0" i="0" dirty="0">
+                <a:solidFill>
+                  <a:srgbClr val="404040"/>
+                </a:solidFill>
+                <a:effectLst/>
+                <a:latin typeface="Times New Roman" panose="02020603050405020304" pitchFamily="18" charset="0"/>
+                <a:cs typeface="Times New Roman" panose="02020603050405020304" pitchFamily="18" charset="0"/>
+              </a:rPr>
+              <a:t>Кэширование</a:t>
+            </a:r>
+          </a:p>
+          <a:p>
+            <a:pPr algn="l">
+              <a:lnSpc>
+                <a:spcPts val="2143"/>
+              </a:lnSpc>
+              <a:spcBef>
+                <a:spcPts val="300"/>
+              </a:spcBef>
+              <a:spcAft>
+                <a:spcPts val="300"/>
+              </a:spcAft>
+              <a:buFont typeface="+mj-lt"/>
+              <a:buAutoNum type="arabicPeriod"/>
+            </a:pPr>
+            <a:r>
+              <a:rPr lang="en-US" b="1" i="0" dirty="0">
+                <a:solidFill>
+                  <a:srgbClr val="404040"/>
+                </a:solidFill>
+                <a:effectLst/>
+                <a:latin typeface="Times New Roman" panose="02020603050405020304" pitchFamily="18" charset="0"/>
+                <a:cs typeface="Times New Roman" panose="02020603050405020304" pitchFamily="18" charset="0"/>
+              </a:rPr>
+              <a:t> </a:t>
+            </a:r>
+            <a:r>
+              <a:rPr lang="ru-RU" b="1" i="0" dirty="0">
+                <a:solidFill>
+                  <a:srgbClr val="404040"/>
+                </a:solidFill>
+                <a:effectLst/>
+                <a:latin typeface="Times New Roman" panose="02020603050405020304" pitchFamily="18" charset="0"/>
+                <a:cs typeface="Times New Roman" panose="02020603050405020304" pitchFamily="18" charset="0"/>
+              </a:rPr>
+              <a:t>Сервис новостей</a:t>
+            </a:r>
+            <a:r>
+              <a:rPr lang="ru-RU" b="0" i="0" dirty="0">
+                <a:solidFill>
+                  <a:srgbClr val="404040"/>
+                </a:solidFill>
+                <a:effectLst/>
+                <a:latin typeface="Times New Roman" panose="02020603050405020304" pitchFamily="18" charset="0"/>
+                <a:cs typeface="Times New Roman" panose="02020603050405020304" pitchFamily="18" charset="0"/>
+              </a:rPr>
+              <a:t>: Обработка 1000+ новостей/час</a:t>
+            </a:r>
+            <a:r>
+              <a:rPr lang="en-US" b="0" i="0" dirty="0">
+                <a:solidFill>
+                  <a:srgbClr val="404040"/>
+                </a:solidFill>
+                <a:effectLst/>
+                <a:latin typeface="Times New Roman" panose="02020603050405020304" pitchFamily="18" charset="0"/>
+                <a:cs typeface="Times New Roman" panose="02020603050405020304" pitchFamily="18" charset="0"/>
+              </a:rPr>
+              <a:t>; </a:t>
+            </a:r>
+          </a:p>
+          <a:p>
+            <a:pPr lvl="1">
+              <a:lnSpc>
+                <a:spcPts val="2143"/>
+              </a:lnSpc>
+              <a:spcBef>
+                <a:spcPts val="300"/>
+              </a:spcBef>
+              <a:spcAft>
+                <a:spcPts val="300"/>
+              </a:spcAft>
+              <a:buFont typeface="Arial" panose="020B0604020202020204" pitchFamily="34" charset="0"/>
+              <a:buChar char="•"/>
+            </a:pPr>
+            <a:r>
+              <a:rPr lang="ru-RU" b="0" i="0" dirty="0">
+                <a:solidFill>
+                  <a:srgbClr val="404040"/>
+                </a:solidFill>
+                <a:effectLst/>
+                <a:latin typeface="Times New Roman" panose="02020603050405020304" pitchFamily="18" charset="0"/>
+                <a:cs typeface="Times New Roman" panose="02020603050405020304" pitchFamily="18" charset="0"/>
+              </a:rPr>
+              <a:t>Внутренние модули: Парсер</a:t>
+            </a:r>
+            <a:r>
+              <a:rPr lang="en-US" b="0" i="0" dirty="0">
+                <a:solidFill>
+                  <a:srgbClr val="404040"/>
+                </a:solidFill>
+                <a:effectLst/>
+                <a:latin typeface="Times New Roman" panose="02020603050405020304" pitchFamily="18" charset="0"/>
+                <a:cs typeface="Times New Roman" panose="02020603050405020304" pitchFamily="18" charset="0"/>
+              </a:rPr>
+              <a:t>; </a:t>
+            </a:r>
+            <a:r>
+              <a:rPr lang="ru-RU" b="0" i="0" dirty="0">
+                <a:solidFill>
+                  <a:srgbClr val="404040"/>
+                </a:solidFill>
+                <a:effectLst/>
+                <a:latin typeface="Times New Roman" panose="02020603050405020304" pitchFamily="18" charset="0"/>
+                <a:cs typeface="Times New Roman" panose="02020603050405020304" pitchFamily="18" charset="0"/>
+              </a:rPr>
+              <a:t>NLP-движок</a:t>
+            </a:r>
+            <a:r>
+              <a:rPr lang="en-US" b="0" i="0" dirty="0">
+                <a:solidFill>
+                  <a:srgbClr val="404040"/>
+                </a:solidFill>
+                <a:effectLst/>
+                <a:latin typeface="Times New Roman" panose="02020603050405020304" pitchFamily="18" charset="0"/>
+                <a:cs typeface="Times New Roman" panose="02020603050405020304" pitchFamily="18" charset="0"/>
+              </a:rPr>
+              <a:t>; </a:t>
+            </a:r>
+            <a:r>
+              <a:rPr lang="ru-RU" b="0" i="0" dirty="0">
+                <a:solidFill>
+                  <a:srgbClr val="404040"/>
+                </a:solidFill>
+                <a:effectLst/>
+                <a:latin typeface="Times New Roman" panose="02020603050405020304" pitchFamily="18" charset="0"/>
+                <a:cs typeface="Times New Roman" panose="02020603050405020304" pitchFamily="18" charset="0"/>
+              </a:rPr>
+              <a:t>Рекомендательный движок</a:t>
+            </a:r>
+            <a:endParaRPr lang="en-US" b="0" i="0" dirty="0">
+              <a:solidFill>
+                <a:srgbClr val="404040"/>
+              </a:solidFill>
+              <a:effectLst/>
+              <a:latin typeface="Times New Roman" panose="02020603050405020304" pitchFamily="18" charset="0"/>
+              <a:cs typeface="Times New Roman" panose="02020603050405020304" pitchFamily="18" charset="0"/>
+            </a:endParaRPr>
+          </a:p>
+          <a:p>
+            <a:pPr marL="457200" indent="-457200" algn="l">
+              <a:lnSpc>
+                <a:spcPts val="2143"/>
+              </a:lnSpc>
+              <a:spcBef>
+                <a:spcPts val="300"/>
+              </a:spcBef>
+              <a:spcAft>
+                <a:spcPts val="300"/>
+              </a:spcAft>
+              <a:buFont typeface="+mj-lt"/>
+              <a:buAutoNum type="arabicPeriod"/>
+            </a:pPr>
+            <a:r>
+              <a:rPr lang="ru-RU" b="1" i="0" dirty="0">
+                <a:solidFill>
+                  <a:srgbClr val="404040"/>
+                </a:solidFill>
+                <a:effectLst/>
+                <a:latin typeface="Times New Roman" panose="02020603050405020304" pitchFamily="18" charset="0"/>
+                <a:cs typeface="Times New Roman" panose="02020603050405020304" pitchFamily="18" charset="0"/>
+              </a:rPr>
+              <a:t>Сервис пользователей</a:t>
+            </a:r>
+            <a:r>
+              <a:rPr lang="ru-RU" b="0" i="0" dirty="0">
+                <a:solidFill>
+                  <a:srgbClr val="404040"/>
+                </a:solidFill>
+                <a:effectLst/>
+                <a:latin typeface="Times New Roman" panose="02020603050405020304" pitchFamily="18" charset="0"/>
+                <a:cs typeface="Times New Roman" panose="02020603050405020304" pitchFamily="18" charset="0"/>
+              </a:rPr>
+              <a:t> Аутентификация</a:t>
+            </a:r>
+            <a:r>
+              <a:rPr lang="en-US" b="0" i="0" dirty="0">
+                <a:solidFill>
+                  <a:srgbClr val="404040"/>
+                </a:solidFill>
+                <a:effectLst/>
+                <a:latin typeface="Times New Roman" panose="02020603050405020304" pitchFamily="18" charset="0"/>
+                <a:cs typeface="Times New Roman" panose="02020603050405020304" pitchFamily="18" charset="0"/>
+              </a:rPr>
+              <a:t>; </a:t>
+            </a:r>
+            <a:r>
+              <a:rPr lang="ru-RU" b="0" i="0" dirty="0">
+                <a:solidFill>
+                  <a:srgbClr val="404040"/>
+                </a:solidFill>
+                <a:effectLst/>
+                <a:latin typeface="Times New Roman" panose="02020603050405020304" pitchFamily="18" charset="0"/>
+                <a:cs typeface="Times New Roman" panose="02020603050405020304" pitchFamily="18" charset="0"/>
+              </a:rPr>
+              <a:t>Профили</a:t>
+            </a:r>
+            <a:r>
+              <a:rPr lang="en-US" dirty="0">
+                <a:solidFill>
+                  <a:srgbClr val="404040"/>
+                </a:solidFill>
+                <a:latin typeface="Times New Roman" panose="02020603050405020304" pitchFamily="18" charset="0"/>
+                <a:cs typeface="Times New Roman" panose="02020603050405020304" pitchFamily="18" charset="0"/>
+              </a:rPr>
+              <a:t>; </a:t>
+            </a:r>
+            <a:r>
+              <a:rPr lang="ru-RU" b="0" i="0" dirty="0">
+                <a:solidFill>
+                  <a:srgbClr val="404040"/>
+                </a:solidFill>
+                <a:effectLst/>
+                <a:latin typeface="Times New Roman" panose="02020603050405020304" pitchFamily="18" charset="0"/>
+                <a:cs typeface="Times New Roman" panose="02020603050405020304" pitchFamily="18" charset="0"/>
+              </a:rPr>
+              <a:t>Подписки</a:t>
+            </a:r>
+            <a:endParaRPr lang="en-US" b="0" i="0" dirty="0">
+              <a:solidFill>
+                <a:srgbClr val="404040"/>
+              </a:solidFill>
+              <a:effectLst/>
+              <a:latin typeface="Times New Roman" panose="02020603050405020304" pitchFamily="18" charset="0"/>
+              <a:cs typeface="Times New Roman" panose="02020603050405020304" pitchFamily="18" charset="0"/>
+            </a:endParaRPr>
+          </a:p>
+          <a:p>
+            <a:pPr algn="l">
+              <a:lnSpc>
+                <a:spcPts val="2143"/>
+              </a:lnSpc>
+              <a:spcBef>
+                <a:spcPts val="300"/>
+              </a:spcBef>
+              <a:spcAft>
+                <a:spcPts val="300"/>
+              </a:spcAft>
+              <a:buFont typeface="+mj-lt"/>
+              <a:buAutoNum type="arabicPeriod"/>
+            </a:pPr>
+            <a:r>
+              <a:rPr lang="en-US" b="1" i="0" dirty="0">
+                <a:solidFill>
+                  <a:srgbClr val="404040"/>
+                </a:solidFill>
+                <a:effectLst/>
+                <a:latin typeface="Times New Roman" panose="02020603050405020304" pitchFamily="18" charset="0"/>
+                <a:cs typeface="Times New Roman" panose="02020603050405020304" pitchFamily="18" charset="0"/>
+              </a:rPr>
+              <a:t> </a:t>
+            </a:r>
+            <a:r>
+              <a:rPr lang="ru-RU" b="1" i="0" dirty="0">
+                <a:solidFill>
+                  <a:srgbClr val="404040"/>
+                </a:solidFill>
+                <a:effectLst/>
+                <a:latin typeface="Times New Roman" panose="02020603050405020304" pitchFamily="18" charset="0"/>
+                <a:cs typeface="Times New Roman" panose="02020603050405020304" pitchFamily="18" charset="0"/>
+              </a:rPr>
+              <a:t>Хранилище</a:t>
+            </a:r>
+            <a:r>
+              <a:rPr lang="ru-RU" b="0" i="0" dirty="0">
+                <a:solidFill>
+                  <a:srgbClr val="404040"/>
+                </a:solidFill>
+                <a:effectLst/>
+                <a:latin typeface="Times New Roman" panose="02020603050405020304" pitchFamily="18" charset="0"/>
+                <a:cs typeface="Times New Roman" panose="02020603050405020304" pitchFamily="18" charset="0"/>
+              </a:rPr>
+              <a:t>:</a:t>
+            </a:r>
+            <a:r>
+              <a:rPr lang="en-US" dirty="0">
+                <a:solidFill>
+                  <a:srgbClr val="404040"/>
+                </a:solidFill>
+                <a:latin typeface="Times New Roman" panose="02020603050405020304" pitchFamily="18" charset="0"/>
+                <a:cs typeface="Times New Roman" panose="02020603050405020304" pitchFamily="18" charset="0"/>
+              </a:rPr>
+              <a:t> </a:t>
+            </a:r>
+            <a:r>
+              <a:rPr lang="en-US" b="0" i="0" dirty="0">
+                <a:solidFill>
+                  <a:srgbClr val="404040"/>
+                </a:solidFill>
+                <a:effectLst/>
+                <a:latin typeface="Times New Roman" panose="02020603050405020304" pitchFamily="18" charset="0"/>
+                <a:cs typeface="Times New Roman" panose="02020603050405020304" pitchFamily="18" charset="0"/>
+              </a:rPr>
+              <a:t>PostgreSQL (</a:t>
+            </a:r>
+            <a:r>
+              <a:rPr lang="ru-RU" b="0" i="0" dirty="0">
+                <a:solidFill>
+                  <a:srgbClr val="404040"/>
+                </a:solidFill>
+                <a:effectLst/>
+                <a:latin typeface="Times New Roman" panose="02020603050405020304" pitchFamily="18" charset="0"/>
+                <a:cs typeface="Times New Roman" panose="02020603050405020304" pitchFamily="18" charset="0"/>
+              </a:rPr>
+              <a:t>основные данные)</a:t>
+            </a:r>
+            <a:r>
+              <a:rPr lang="en-US" b="0" i="0" dirty="0">
+                <a:solidFill>
+                  <a:srgbClr val="404040"/>
+                </a:solidFill>
+                <a:effectLst/>
+                <a:latin typeface="Times New Roman" panose="02020603050405020304" pitchFamily="18" charset="0"/>
+                <a:cs typeface="Times New Roman" panose="02020603050405020304" pitchFamily="18" charset="0"/>
+              </a:rPr>
+              <a:t>; Elasticsearch (</a:t>
+            </a:r>
+            <a:r>
+              <a:rPr lang="ru-RU" b="0" i="0" dirty="0">
+                <a:solidFill>
+                  <a:srgbClr val="404040"/>
+                </a:solidFill>
+                <a:effectLst/>
+                <a:latin typeface="Times New Roman" panose="02020603050405020304" pitchFamily="18" charset="0"/>
+                <a:cs typeface="Times New Roman" panose="02020603050405020304" pitchFamily="18" charset="0"/>
+              </a:rPr>
+              <a:t>поиск)</a:t>
+            </a:r>
+            <a:r>
+              <a:rPr lang="en-US" dirty="0">
+                <a:solidFill>
+                  <a:srgbClr val="404040"/>
+                </a:solidFill>
+                <a:latin typeface="Times New Roman" panose="02020603050405020304" pitchFamily="18" charset="0"/>
+                <a:cs typeface="Times New Roman" panose="02020603050405020304" pitchFamily="18" charset="0"/>
+              </a:rPr>
+              <a:t>; </a:t>
+            </a:r>
+            <a:r>
+              <a:rPr lang="en-US" b="0" i="0" dirty="0">
+                <a:solidFill>
+                  <a:srgbClr val="404040"/>
+                </a:solidFill>
+                <a:effectLst/>
+                <a:latin typeface="Times New Roman" panose="02020603050405020304" pitchFamily="18" charset="0"/>
+                <a:cs typeface="Times New Roman" panose="02020603050405020304" pitchFamily="18" charset="0"/>
+              </a:rPr>
+              <a:t>Redis (</a:t>
+            </a:r>
+            <a:r>
+              <a:rPr lang="ru-RU" b="0" i="0" dirty="0">
+                <a:solidFill>
+                  <a:srgbClr val="404040"/>
+                </a:solidFill>
+                <a:effectLst/>
+                <a:latin typeface="Times New Roman" panose="02020603050405020304" pitchFamily="18" charset="0"/>
+                <a:cs typeface="Times New Roman" panose="02020603050405020304" pitchFamily="18" charset="0"/>
+              </a:rPr>
+              <a:t>кэш)</a:t>
+            </a:r>
+          </a:p>
+          <a:p>
+            <a:pPr marL="457200" indent="-457200" algn="l">
+              <a:lnSpc>
+                <a:spcPts val="2143"/>
+              </a:lnSpc>
+              <a:spcBef>
+                <a:spcPts val="300"/>
+              </a:spcBef>
+              <a:spcAft>
+                <a:spcPts val="300"/>
+              </a:spcAft>
+              <a:buFont typeface="+mj-lt"/>
+              <a:buAutoNum type="arabicPeriod"/>
+            </a:pPr>
+            <a:endParaRPr lang="ru-RU" b="0" i="0" dirty="0">
+              <a:solidFill>
+                <a:srgbClr val="404040"/>
+              </a:solidFill>
+              <a:effectLst/>
+              <a:latin typeface="Times New Roman" panose="02020603050405020304" pitchFamily="18" charset="0"/>
+              <a:cs typeface="Times New Roman" panose="02020603050405020304" pitchFamily="18" charset="0"/>
+            </a:endParaRPr>
+          </a:p>
+          <a:p>
+            <a:pPr marL="457200" indent="-457200" algn="l">
+              <a:lnSpc>
+                <a:spcPts val="2143"/>
+              </a:lnSpc>
+              <a:spcBef>
+                <a:spcPts val="300"/>
+              </a:spcBef>
+              <a:spcAft>
+                <a:spcPts val="300"/>
+              </a:spcAft>
+              <a:buFont typeface="+mj-lt"/>
+              <a:buAutoNum type="arabicPeriod"/>
+            </a:pPr>
+            <a:endParaRPr lang="ru-RU" b="0" i="0" dirty="0">
+              <a:solidFill>
+                <a:srgbClr val="404040"/>
+              </a:solidFill>
+              <a:effectLst/>
+              <a:latin typeface="Times New Roman" panose="02020603050405020304" pitchFamily="18" charset="0"/>
+              <a:cs typeface="Times New Roman" panose="02020603050405020304" pitchFamily="18" charset="0"/>
+            </a:endParaRPr>
+          </a:p>
+          <a:p>
+            <a:endParaRPr lang="ru-RU" dirty="0">
+              <a:latin typeface="Times New Roman" panose="02020603050405020304" pitchFamily="18" charset="0"/>
+              <a:cs typeface="Times New Roman" panose="02020603050405020304" pitchFamily="18" charset="0"/>
+            </a:endParaRPr>
           </a:p>
         </p:txBody>
       </p:sp>
@@ -4734,6 +5261,1359 @@
     <p:extLst>
       <p:ext uri="{BB962C8B-B14F-4D97-AF65-F5344CB8AC3E}">
         <p14:creationId xmlns:p14="http://schemas.microsoft.com/office/powerpoint/2010/main" val="3966692499"/>
+      </p:ext>
+    </p:extLst>
+  </p:cSld>
+  <p:clrMapOvr>
+    <a:masterClrMapping/>
+  </p:clrMapOvr>
+</p:sld>
+</file>
+
+<file path=ppt/slides/slide6.xml><?xml version="1.0" encoding="utf-8"?>
+<p:sld xmlns:a="http://schemas.openxmlformats.org/drawingml/2006/main" xmlns:r="http://schemas.openxmlformats.org/officeDocument/2006/relationships" xmlns:p="http://schemas.openxmlformats.org/presentationml/2006/main">
+  <p:cSld>
+    <p:spTree>
+      <p:nvGrpSpPr>
+        <p:cNvPr id="1" name="">
+          <a:extLst>
+            <a:ext uri="{FF2B5EF4-FFF2-40B4-BE49-F238E27FC236}">
+              <a16:creationId xmlns:a16="http://schemas.microsoft.com/office/drawing/2014/main" id="{3408EE58-F694-2906-69BC-00F901CF7FB7}"/>
+            </a:ext>
+          </a:extLst>
+        </p:cNvPr>
+        <p:cNvGrpSpPr/>
+        <p:nvPr/>
+      </p:nvGrpSpPr>
+      <p:grpSpPr>
+        <a:xfrm>
+          <a:off x="0" y="0"/>
+          <a:ext cx="0" cy="0"/>
+          <a:chOff x="0" y="0"/>
+          <a:chExt cx="0" cy="0"/>
+        </a:xfrm>
+      </p:grpSpPr>
+      <p:sp>
+        <p:nvSpPr>
+          <p:cNvPr id="2" name="Заголовок 1">
+            <a:extLst>
+              <a:ext uri="{FF2B5EF4-FFF2-40B4-BE49-F238E27FC236}">
+                <a16:creationId xmlns:a16="http://schemas.microsoft.com/office/drawing/2014/main" id="{5DBFB330-8A2A-317D-3FE7-70510876C22E}"/>
+              </a:ext>
+            </a:extLst>
+          </p:cNvPr>
+          <p:cNvSpPr>
+            <a:spLocks noGrp="1"/>
+          </p:cNvSpPr>
+          <p:nvPr>
+            <p:ph type="title"/>
+          </p:nvPr>
+        </p:nvSpPr>
+        <p:spPr/>
+        <p:txBody>
+          <a:bodyPr/>
+          <a:lstStyle/>
+          <a:p>
+            <a:r>
+              <a:rPr lang="ru-RU" dirty="0"/>
+              <a:t>Распределение функциональности</a:t>
+            </a:r>
+          </a:p>
+        </p:txBody>
+      </p:sp>
+      <p:graphicFrame>
+        <p:nvGraphicFramePr>
+          <p:cNvPr id="5" name="Объект 4">
+            <a:extLst>
+              <a:ext uri="{FF2B5EF4-FFF2-40B4-BE49-F238E27FC236}">
+                <a16:creationId xmlns:a16="http://schemas.microsoft.com/office/drawing/2014/main" id="{CD147940-9A77-0421-BC6E-060942A5ACE9}"/>
+              </a:ext>
+            </a:extLst>
+          </p:cNvPr>
+          <p:cNvGraphicFramePr>
+            <a:graphicFrameLocks noGrp="1"/>
+          </p:cNvGraphicFramePr>
+          <p:nvPr>
+            <p:ph idx="1"/>
+          </p:nvPr>
+        </p:nvGraphicFramePr>
+        <p:xfrm>
+          <a:off x="1096963" y="2558415"/>
+          <a:ext cx="10058400" cy="2598420"/>
+        </p:xfrm>
+        <a:graphic>
+          <a:graphicData uri="http://schemas.openxmlformats.org/drawingml/2006/table">
+            <a:tbl>
+              <a:tblPr/>
+              <a:tblGrid>
+                <a:gridCol w="3313122">
+                  <a:extLst>
+                    <a:ext uri="{9D8B030D-6E8A-4147-A177-3AD203B41FA5}">
+                      <a16:colId xmlns:a16="http://schemas.microsoft.com/office/drawing/2014/main" val="2773493536"/>
+                    </a:ext>
+                  </a:extLst>
+                </a:gridCol>
+                <a:gridCol w="3372639">
+                  <a:extLst>
+                    <a:ext uri="{9D8B030D-6E8A-4147-A177-3AD203B41FA5}">
+                      <a16:colId xmlns:a16="http://schemas.microsoft.com/office/drawing/2014/main" val="2881812050"/>
+                    </a:ext>
+                  </a:extLst>
+                </a:gridCol>
+                <a:gridCol w="3372639">
+                  <a:extLst>
+                    <a:ext uri="{9D8B030D-6E8A-4147-A177-3AD203B41FA5}">
+                      <a16:colId xmlns:a16="http://schemas.microsoft.com/office/drawing/2014/main" val="2518634625"/>
+                    </a:ext>
+                  </a:extLst>
+                </a:gridCol>
+              </a:tblGrid>
+              <a:tr h="0">
+                <a:tc>
+                  <a:txBody>
+                    <a:bodyPr/>
+                    <a:lstStyle/>
+                    <a:p>
+                      <a:pPr algn="l"/>
+                      <a:r>
+                        <a:rPr lang="ru-RU" b="1" dirty="0">
+                          <a:solidFill>
+                            <a:srgbClr val="404040"/>
+                          </a:solidFill>
+                          <a:effectLst/>
+                        </a:rPr>
+                        <a:t>Компонент</a:t>
+                      </a:r>
+                    </a:p>
+                  </a:txBody>
+                  <a:tcPr marR="95250" marT="95250" marB="95250" anchor="ctr">
+                    <a:lnL>
+                      <a:noFill/>
+                    </a:lnL>
+                    <a:lnR>
+                      <a:noFill/>
+                    </a:lnR>
+                    <a:lnT>
+                      <a:noFill/>
+                    </a:lnT>
+                    <a:lnB w="9525" cap="flat" cmpd="sng" algn="ctr">
+                      <a:solidFill>
+                        <a:srgbClr val="BBBBBB"/>
+                      </a:solidFill>
+                      <a:prstDash val="solid"/>
+                      <a:round/>
+                      <a:headEnd type="none" w="med" len="med"/>
+                      <a:tailEnd type="none" w="med" len="med"/>
+                    </a:lnB>
+                    <a:solidFill>
+                      <a:srgbClr val="FFFFFF"/>
+                    </a:solidFill>
+                  </a:tcPr>
+                </a:tc>
+                <a:tc>
+                  <a:txBody>
+                    <a:bodyPr/>
+                    <a:lstStyle/>
+                    <a:p>
+                      <a:pPr algn="l"/>
+                      <a:r>
+                        <a:rPr lang="ru-RU" b="1">
+                          <a:solidFill>
+                            <a:srgbClr val="404040"/>
+                          </a:solidFill>
+                          <a:effectLst/>
+                        </a:rPr>
+                        <a:t>Функции</a:t>
+                      </a:r>
+                    </a:p>
+                  </a:txBody>
+                  <a:tcPr marL="95250" marR="95250" marT="95250" marB="95250" anchor="ctr">
+                    <a:lnL>
+                      <a:noFill/>
+                    </a:lnL>
+                    <a:lnR>
+                      <a:noFill/>
+                    </a:lnR>
+                    <a:lnT>
+                      <a:noFill/>
+                    </a:lnT>
+                    <a:lnB w="9525" cap="flat" cmpd="sng" algn="ctr">
+                      <a:solidFill>
+                        <a:srgbClr val="BBBBBB"/>
+                      </a:solidFill>
+                      <a:prstDash val="solid"/>
+                      <a:round/>
+                      <a:headEnd type="none" w="med" len="med"/>
+                      <a:tailEnd type="none" w="med" len="med"/>
+                    </a:lnB>
+                    <a:solidFill>
+                      <a:srgbClr val="FFFFFF"/>
+                    </a:solidFill>
+                  </a:tcPr>
+                </a:tc>
+                <a:tc>
+                  <a:txBody>
+                    <a:bodyPr/>
+                    <a:lstStyle/>
+                    <a:p>
+                      <a:pPr algn="l"/>
+                      <a:r>
+                        <a:rPr lang="ru-RU" b="1">
+                          <a:solidFill>
+                            <a:srgbClr val="404040"/>
+                          </a:solidFill>
+                          <a:effectLst/>
+                        </a:rPr>
+                        <a:t>Характеристики</a:t>
+                      </a:r>
+                    </a:p>
+                  </a:txBody>
+                  <a:tcPr marL="95250" marR="95250" marT="95250" marB="95250" anchor="ctr">
+                    <a:lnL>
+                      <a:noFill/>
+                    </a:lnL>
+                    <a:lnR>
+                      <a:noFill/>
+                    </a:lnR>
+                    <a:lnT>
+                      <a:noFill/>
+                    </a:lnT>
+                    <a:lnB w="9525" cap="flat" cmpd="sng" algn="ctr">
+                      <a:solidFill>
+                        <a:srgbClr val="BBBBBB"/>
+                      </a:solidFill>
+                      <a:prstDash val="solid"/>
+                      <a:round/>
+                      <a:headEnd type="none" w="med" len="med"/>
+                      <a:tailEnd type="none" w="med" len="med"/>
+                    </a:lnB>
+                    <a:solidFill>
+                      <a:srgbClr val="FFFFFF"/>
+                    </a:solidFill>
+                  </a:tcPr>
+                </a:tc>
+                <a:extLst>
+                  <a:ext uri="{0D108BD9-81ED-4DB2-BD59-A6C34878D82A}">
+                    <a16:rowId xmlns:a16="http://schemas.microsoft.com/office/drawing/2014/main" val="2742267979"/>
+                  </a:ext>
+                </a:extLst>
+              </a:tr>
+              <a:tr h="0">
+                <a:tc>
+                  <a:txBody>
+                    <a:bodyPr/>
+                    <a:lstStyle/>
+                    <a:p>
+                      <a:r>
+                        <a:rPr lang="ru-RU" dirty="0">
+                          <a:effectLst/>
+                        </a:rPr>
+                        <a:t>Парсер</a:t>
+                      </a:r>
+                    </a:p>
+                  </a:txBody>
+                  <a:tcPr marR="95250" marT="95250" marB="95250" anchor="ctr">
+                    <a:lnL>
+                      <a:noFill/>
+                    </a:lnL>
+                    <a:lnR>
+                      <a:noFill/>
+                    </a:lnR>
+                    <a:lnT w="9525" cap="flat" cmpd="sng" algn="ctr">
+                      <a:solidFill>
+                        <a:srgbClr val="BBBBBB"/>
+                      </a:solidFill>
+                      <a:prstDash val="solid"/>
+                      <a:round/>
+                      <a:headEnd type="none" w="med" len="med"/>
+                      <a:tailEnd type="none" w="med" len="med"/>
+                    </a:lnT>
+                    <a:lnB w="9525" cap="flat" cmpd="sng" algn="ctr">
+                      <a:solidFill>
+                        <a:srgbClr val="E5E5E5"/>
+                      </a:solidFill>
+                      <a:prstDash val="solid"/>
+                      <a:round/>
+                      <a:headEnd type="none" w="med" len="med"/>
+                      <a:tailEnd type="none" w="med" len="med"/>
+                    </a:lnB>
+                    <a:solidFill>
+                      <a:srgbClr val="FFFFFF"/>
+                    </a:solidFill>
+                  </a:tcPr>
+                </a:tc>
+                <a:tc>
+                  <a:txBody>
+                    <a:bodyPr/>
+                    <a:lstStyle/>
+                    <a:p>
+                      <a:r>
+                        <a:rPr lang="ru-RU">
+                          <a:effectLst/>
+                        </a:rPr>
+                        <a:t>Сбор, дедупликация</a:t>
+                      </a:r>
+                    </a:p>
+                  </a:txBody>
+                  <a:tcPr marL="95250" marR="95250" marT="95250" marB="95250" anchor="ctr">
+                    <a:lnL>
+                      <a:noFill/>
+                    </a:lnL>
+                    <a:lnR>
+                      <a:noFill/>
+                    </a:lnR>
+                    <a:lnT w="9525" cap="flat" cmpd="sng" algn="ctr">
+                      <a:solidFill>
+                        <a:srgbClr val="BBBBBB"/>
+                      </a:solidFill>
+                      <a:prstDash val="solid"/>
+                      <a:round/>
+                      <a:headEnd type="none" w="med" len="med"/>
+                      <a:tailEnd type="none" w="med" len="med"/>
+                    </a:lnT>
+                    <a:lnB w="9525" cap="flat" cmpd="sng" algn="ctr">
+                      <a:solidFill>
+                        <a:srgbClr val="E5E5E5"/>
+                      </a:solidFill>
+                      <a:prstDash val="solid"/>
+                      <a:round/>
+                      <a:headEnd type="none" w="med" len="med"/>
+                      <a:tailEnd type="none" w="med" len="med"/>
+                    </a:lnB>
+                    <a:solidFill>
+                      <a:srgbClr val="FFFFFF"/>
+                    </a:solidFill>
+                  </a:tcPr>
+                </a:tc>
+                <a:tc>
+                  <a:txBody>
+                    <a:bodyPr/>
+                    <a:lstStyle/>
+                    <a:p>
+                      <a:r>
+                        <a:rPr lang="ru-RU">
+                          <a:effectLst/>
+                        </a:rPr>
+                        <a:t>Высокая пропускная способность</a:t>
+                      </a:r>
+                    </a:p>
+                  </a:txBody>
+                  <a:tcPr marL="95250" marR="95250" marT="95250" marB="95250" anchor="ctr">
+                    <a:lnL>
+                      <a:noFill/>
+                    </a:lnL>
+                    <a:lnR>
+                      <a:noFill/>
+                    </a:lnR>
+                    <a:lnT w="9525" cap="flat" cmpd="sng" algn="ctr">
+                      <a:solidFill>
+                        <a:srgbClr val="BBBBBB"/>
+                      </a:solidFill>
+                      <a:prstDash val="solid"/>
+                      <a:round/>
+                      <a:headEnd type="none" w="med" len="med"/>
+                      <a:tailEnd type="none" w="med" len="med"/>
+                    </a:lnT>
+                    <a:lnB w="9525" cap="flat" cmpd="sng" algn="ctr">
+                      <a:solidFill>
+                        <a:srgbClr val="E5E5E5"/>
+                      </a:solidFill>
+                      <a:prstDash val="solid"/>
+                      <a:round/>
+                      <a:headEnd type="none" w="med" len="med"/>
+                      <a:tailEnd type="none" w="med" len="med"/>
+                    </a:lnB>
+                    <a:solidFill>
+                      <a:srgbClr val="FFFFFF"/>
+                    </a:solidFill>
+                  </a:tcPr>
+                </a:tc>
+                <a:extLst>
+                  <a:ext uri="{0D108BD9-81ED-4DB2-BD59-A6C34878D82A}">
+                    <a16:rowId xmlns:a16="http://schemas.microsoft.com/office/drawing/2014/main" val="500941687"/>
+                  </a:ext>
+                </a:extLst>
+              </a:tr>
+              <a:tr h="0">
+                <a:tc>
+                  <a:txBody>
+                    <a:bodyPr/>
+                    <a:lstStyle/>
+                    <a:p>
+                      <a:r>
+                        <a:rPr lang="en-US">
+                          <a:effectLst/>
+                        </a:rPr>
+                        <a:t>NLP-</a:t>
+                      </a:r>
+                      <a:r>
+                        <a:rPr lang="ru-RU">
+                          <a:effectLst/>
+                        </a:rPr>
+                        <a:t>движок</a:t>
+                      </a:r>
+                    </a:p>
+                  </a:txBody>
+                  <a:tcPr marR="95250" marT="95250" marB="95250" anchor="ctr">
+                    <a:lnL>
+                      <a:noFill/>
+                    </a:lnL>
+                    <a:lnR>
+                      <a:noFill/>
+                    </a:lnR>
+                    <a:lnT w="9525" cap="flat" cmpd="sng" algn="ctr">
+                      <a:solidFill>
+                        <a:srgbClr val="E5E5E5"/>
+                      </a:solidFill>
+                      <a:prstDash val="solid"/>
+                      <a:round/>
+                      <a:headEnd type="none" w="med" len="med"/>
+                      <a:tailEnd type="none" w="med" len="med"/>
+                    </a:lnT>
+                    <a:lnB w="9525" cap="flat" cmpd="sng" algn="ctr">
+                      <a:solidFill>
+                        <a:srgbClr val="E5E5E5"/>
+                      </a:solidFill>
+                      <a:prstDash val="solid"/>
+                      <a:round/>
+                      <a:headEnd type="none" w="med" len="med"/>
+                      <a:tailEnd type="none" w="med" len="med"/>
+                    </a:lnB>
+                    <a:solidFill>
+                      <a:srgbClr val="FFFFFF"/>
+                    </a:solidFill>
+                  </a:tcPr>
+                </a:tc>
+                <a:tc>
+                  <a:txBody>
+                    <a:bodyPr/>
+                    <a:lstStyle/>
+                    <a:p>
+                      <a:r>
+                        <a:rPr lang="ru-RU">
+                          <a:effectLst/>
+                        </a:rPr>
+                        <a:t>Категоризация, анализ</a:t>
+                      </a:r>
+                    </a:p>
+                  </a:txBody>
+                  <a:tcPr marL="95250" marR="95250" marT="95250" marB="95250" anchor="ctr">
+                    <a:lnL>
+                      <a:noFill/>
+                    </a:lnL>
+                    <a:lnR>
+                      <a:noFill/>
+                    </a:lnR>
+                    <a:lnT w="9525" cap="flat" cmpd="sng" algn="ctr">
+                      <a:solidFill>
+                        <a:srgbClr val="E5E5E5"/>
+                      </a:solidFill>
+                      <a:prstDash val="solid"/>
+                      <a:round/>
+                      <a:headEnd type="none" w="med" len="med"/>
+                      <a:tailEnd type="none" w="med" len="med"/>
+                    </a:lnT>
+                    <a:lnB w="9525" cap="flat" cmpd="sng" algn="ctr">
+                      <a:solidFill>
+                        <a:srgbClr val="E5E5E5"/>
+                      </a:solidFill>
+                      <a:prstDash val="solid"/>
+                      <a:round/>
+                      <a:headEnd type="none" w="med" len="med"/>
+                      <a:tailEnd type="none" w="med" len="med"/>
+                    </a:lnB>
+                    <a:solidFill>
+                      <a:srgbClr val="FFFFFF"/>
+                    </a:solidFill>
+                  </a:tcPr>
+                </a:tc>
+                <a:tc>
+                  <a:txBody>
+                    <a:bodyPr/>
+                    <a:lstStyle/>
+                    <a:p>
+                      <a:r>
+                        <a:rPr lang="ru-RU">
+                          <a:effectLst/>
+                        </a:rPr>
+                        <a:t>Высокая </a:t>
+                      </a:r>
+                      <a:r>
+                        <a:rPr lang="en-US">
+                          <a:effectLst/>
+                        </a:rPr>
+                        <a:t>CPU-</a:t>
+                      </a:r>
+                      <a:r>
+                        <a:rPr lang="ru-RU">
+                          <a:effectLst/>
+                        </a:rPr>
+                        <a:t>нагрузка</a:t>
+                      </a:r>
+                    </a:p>
+                  </a:txBody>
+                  <a:tcPr marL="95250" marR="95250" marT="95250" marB="95250" anchor="ctr">
+                    <a:lnL>
+                      <a:noFill/>
+                    </a:lnL>
+                    <a:lnR>
+                      <a:noFill/>
+                    </a:lnR>
+                    <a:lnT w="9525" cap="flat" cmpd="sng" algn="ctr">
+                      <a:solidFill>
+                        <a:srgbClr val="E5E5E5"/>
+                      </a:solidFill>
+                      <a:prstDash val="solid"/>
+                      <a:round/>
+                      <a:headEnd type="none" w="med" len="med"/>
+                      <a:tailEnd type="none" w="med" len="med"/>
+                    </a:lnT>
+                    <a:lnB w="9525" cap="flat" cmpd="sng" algn="ctr">
+                      <a:solidFill>
+                        <a:srgbClr val="E5E5E5"/>
+                      </a:solidFill>
+                      <a:prstDash val="solid"/>
+                      <a:round/>
+                      <a:headEnd type="none" w="med" len="med"/>
+                      <a:tailEnd type="none" w="med" len="med"/>
+                    </a:lnB>
+                    <a:solidFill>
+                      <a:srgbClr val="FFFFFF"/>
+                    </a:solidFill>
+                  </a:tcPr>
+                </a:tc>
+                <a:extLst>
+                  <a:ext uri="{0D108BD9-81ED-4DB2-BD59-A6C34878D82A}">
+                    <a16:rowId xmlns:a16="http://schemas.microsoft.com/office/drawing/2014/main" val="2431732254"/>
+                  </a:ext>
+                </a:extLst>
+              </a:tr>
+              <a:tr h="0">
+                <a:tc>
+                  <a:txBody>
+                    <a:bodyPr/>
+                    <a:lstStyle/>
+                    <a:p>
+                      <a:r>
+                        <a:rPr lang="ru-RU">
+                          <a:effectLst/>
+                        </a:rPr>
+                        <a:t>Рекомендации</a:t>
+                      </a:r>
+                    </a:p>
+                  </a:txBody>
+                  <a:tcPr marR="95250" marT="95250" marB="95250" anchor="ctr">
+                    <a:lnL>
+                      <a:noFill/>
+                    </a:lnL>
+                    <a:lnR>
+                      <a:noFill/>
+                    </a:lnR>
+                    <a:lnT w="9525" cap="flat" cmpd="sng" algn="ctr">
+                      <a:solidFill>
+                        <a:srgbClr val="E5E5E5"/>
+                      </a:solidFill>
+                      <a:prstDash val="solid"/>
+                      <a:round/>
+                      <a:headEnd type="none" w="med" len="med"/>
+                      <a:tailEnd type="none" w="med" len="med"/>
+                    </a:lnT>
+                    <a:lnB w="9525" cap="flat" cmpd="sng" algn="ctr">
+                      <a:solidFill>
+                        <a:srgbClr val="E5E5E5"/>
+                      </a:solidFill>
+                      <a:prstDash val="solid"/>
+                      <a:round/>
+                      <a:headEnd type="none" w="med" len="med"/>
+                      <a:tailEnd type="none" w="med" len="med"/>
+                    </a:lnB>
+                    <a:solidFill>
+                      <a:srgbClr val="FFFFFF"/>
+                    </a:solidFill>
+                  </a:tcPr>
+                </a:tc>
+                <a:tc>
+                  <a:txBody>
+                    <a:bodyPr/>
+                    <a:lstStyle/>
+                    <a:p>
+                      <a:r>
+                        <a:rPr lang="ru-RU">
+                          <a:effectLst/>
+                        </a:rPr>
+                        <a:t>Персонализация</a:t>
+                      </a:r>
+                    </a:p>
+                  </a:txBody>
+                  <a:tcPr marL="95250" marR="95250" marT="95250" marB="95250" anchor="ctr">
+                    <a:lnL>
+                      <a:noFill/>
+                    </a:lnL>
+                    <a:lnR>
+                      <a:noFill/>
+                    </a:lnR>
+                    <a:lnT w="9525" cap="flat" cmpd="sng" algn="ctr">
+                      <a:solidFill>
+                        <a:srgbClr val="E5E5E5"/>
+                      </a:solidFill>
+                      <a:prstDash val="solid"/>
+                      <a:round/>
+                      <a:headEnd type="none" w="med" len="med"/>
+                      <a:tailEnd type="none" w="med" len="med"/>
+                    </a:lnT>
+                    <a:lnB w="9525" cap="flat" cmpd="sng" algn="ctr">
+                      <a:solidFill>
+                        <a:srgbClr val="E5E5E5"/>
+                      </a:solidFill>
+                      <a:prstDash val="solid"/>
+                      <a:round/>
+                      <a:headEnd type="none" w="med" len="med"/>
+                      <a:tailEnd type="none" w="med" len="med"/>
+                    </a:lnB>
+                    <a:solidFill>
+                      <a:srgbClr val="FFFFFF"/>
+                    </a:solidFill>
+                  </a:tcPr>
+                </a:tc>
+                <a:tc>
+                  <a:txBody>
+                    <a:bodyPr/>
+                    <a:lstStyle/>
+                    <a:p>
+                      <a:r>
+                        <a:rPr lang="ru-RU">
+                          <a:effectLst/>
+                        </a:rPr>
+                        <a:t>Низкая задержка (&lt;100мс)</a:t>
+                      </a:r>
+                    </a:p>
+                  </a:txBody>
+                  <a:tcPr marL="95250" marR="95250" marT="95250" marB="95250" anchor="ctr">
+                    <a:lnL>
+                      <a:noFill/>
+                    </a:lnL>
+                    <a:lnR>
+                      <a:noFill/>
+                    </a:lnR>
+                    <a:lnT w="9525" cap="flat" cmpd="sng" algn="ctr">
+                      <a:solidFill>
+                        <a:srgbClr val="E5E5E5"/>
+                      </a:solidFill>
+                      <a:prstDash val="solid"/>
+                      <a:round/>
+                      <a:headEnd type="none" w="med" len="med"/>
+                      <a:tailEnd type="none" w="med" len="med"/>
+                    </a:lnT>
+                    <a:lnB w="9525" cap="flat" cmpd="sng" algn="ctr">
+                      <a:solidFill>
+                        <a:srgbClr val="E5E5E5"/>
+                      </a:solidFill>
+                      <a:prstDash val="solid"/>
+                      <a:round/>
+                      <a:headEnd type="none" w="med" len="med"/>
+                      <a:tailEnd type="none" w="med" len="med"/>
+                    </a:lnB>
+                    <a:solidFill>
+                      <a:srgbClr val="FFFFFF"/>
+                    </a:solidFill>
+                  </a:tcPr>
+                </a:tc>
+                <a:extLst>
+                  <a:ext uri="{0D108BD9-81ED-4DB2-BD59-A6C34878D82A}">
+                    <a16:rowId xmlns:a16="http://schemas.microsoft.com/office/drawing/2014/main" val="3173333998"/>
+                  </a:ext>
+                </a:extLst>
+              </a:tr>
+              <a:tr h="0">
+                <a:tc>
+                  <a:txBody>
+                    <a:bodyPr/>
+                    <a:lstStyle/>
+                    <a:p>
+                      <a:r>
+                        <a:rPr lang="en-US">
+                          <a:effectLst/>
+                        </a:rPr>
+                        <a:t>API Gateway</a:t>
+                      </a:r>
+                    </a:p>
+                  </a:txBody>
+                  <a:tcPr marR="95250" marT="95250" marB="95250" anchor="ctr">
+                    <a:lnL>
+                      <a:noFill/>
+                    </a:lnL>
+                    <a:lnR>
+                      <a:noFill/>
+                    </a:lnR>
+                    <a:lnT w="9525" cap="flat" cmpd="sng" algn="ctr">
+                      <a:solidFill>
+                        <a:srgbClr val="E5E5E5"/>
+                      </a:solidFill>
+                      <a:prstDash val="solid"/>
+                      <a:round/>
+                      <a:headEnd type="none" w="med" len="med"/>
+                      <a:tailEnd type="none" w="med" len="med"/>
+                    </a:lnT>
+                    <a:lnB w="9525" cap="flat" cmpd="sng" algn="ctr">
+                      <a:solidFill>
+                        <a:srgbClr val="E5E5E5"/>
+                      </a:solidFill>
+                      <a:prstDash val="solid"/>
+                      <a:round/>
+                      <a:headEnd type="none" w="med" len="med"/>
+                      <a:tailEnd type="none" w="med" len="med"/>
+                    </a:lnB>
+                    <a:solidFill>
+                      <a:srgbClr val="FFFFFF"/>
+                    </a:solidFill>
+                  </a:tcPr>
+                </a:tc>
+                <a:tc>
+                  <a:txBody>
+                    <a:bodyPr/>
+                    <a:lstStyle/>
+                    <a:p>
+                      <a:r>
+                        <a:rPr lang="ru-RU">
+                          <a:effectLst/>
+                        </a:rPr>
+                        <a:t>Маршрутизация</a:t>
+                      </a:r>
+                    </a:p>
+                  </a:txBody>
+                  <a:tcPr marL="95250" marR="95250" marT="95250" marB="95250" anchor="ctr">
+                    <a:lnL>
+                      <a:noFill/>
+                    </a:lnL>
+                    <a:lnR>
+                      <a:noFill/>
+                    </a:lnR>
+                    <a:lnT w="9525" cap="flat" cmpd="sng" algn="ctr">
+                      <a:solidFill>
+                        <a:srgbClr val="E5E5E5"/>
+                      </a:solidFill>
+                      <a:prstDash val="solid"/>
+                      <a:round/>
+                      <a:headEnd type="none" w="med" len="med"/>
+                      <a:tailEnd type="none" w="med" len="med"/>
+                    </a:lnT>
+                    <a:lnB w="9525" cap="flat" cmpd="sng" algn="ctr">
+                      <a:solidFill>
+                        <a:srgbClr val="E5E5E5"/>
+                      </a:solidFill>
+                      <a:prstDash val="solid"/>
+                      <a:round/>
+                      <a:headEnd type="none" w="med" len="med"/>
+                      <a:tailEnd type="none" w="med" len="med"/>
+                    </a:lnB>
+                    <a:solidFill>
+                      <a:srgbClr val="FFFFFF"/>
+                    </a:solidFill>
+                  </a:tcPr>
+                </a:tc>
+                <a:tc>
+                  <a:txBody>
+                    <a:bodyPr/>
+                    <a:lstStyle/>
+                    <a:p>
+                      <a:r>
+                        <a:rPr lang="ru-RU" dirty="0">
+                          <a:effectLst/>
+                        </a:rPr>
+                        <a:t>Высокая доступность (99.99%)</a:t>
+                      </a:r>
+                    </a:p>
+                  </a:txBody>
+                  <a:tcPr marL="95250" marR="95250" marT="95250" marB="95250" anchor="ctr">
+                    <a:lnL>
+                      <a:noFill/>
+                    </a:lnL>
+                    <a:lnR>
+                      <a:noFill/>
+                    </a:lnR>
+                    <a:lnT w="9525" cap="flat" cmpd="sng" algn="ctr">
+                      <a:solidFill>
+                        <a:srgbClr val="E5E5E5"/>
+                      </a:solidFill>
+                      <a:prstDash val="solid"/>
+                      <a:round/>
+                      <a:headEnd type="none" w="med" len="med"/>
+                      <a:tailEnd type="none" w="med" len="med"/>
+                    </a:lnT>
+                    <a:lnB w="9525" cap="flat" cmpd="sng" algn="ctr">
+                      <a:solidFill>
+                        <a:srgbClr val="E5E5E5"/>
+                      </a:solidFill>
+                      <a:prstDash val="solid"/>
+                      <a:round/>
+                      <a:headEnd type="none" w="med" len="med"/>
+                      <a:tailEnd type="none" w="med" len="med"/>
+                    </a:lnB>
+                    <a:solidFill>
+                      <a:srgbClr val="FFFFFF"/>
+                    </a:solidFill>
+                  </a:tcPr>
+                </a:tc>
+                <a:extLst>
+                  <a:ext uri="{0D108BD9-81ED-4DB2-BD59-A6C34878D82A}">
+                    <a16:rowId xmlns:a16="http://schemas.microsoft.com/office/drawing/2014/main" val="3455610165"/>
+                  </a:ext>
+                </a:extLst>
+              </a:tr>
+            </a:tbl>
+          </a:graphicData>
+        </a:graphic>
+      </p:graphicFrame>
+    </p:spTree>
+    <p:extLst>
+      <p:ext uri="{BB962C8B-B14F-4D97-AF65-F5344CB8AC3E}">
+        <p14:creationId xmlns:p14="http://schemas.microsoft.com/office/powerpoint/2010/main" val="302017806"/>
+      </p:ext>
+    </p:extLst>
+  </p:cSld>
+  <p:clrMapOvr>
+    <a:masterClrMapping/>
+  </p:clrMapOvr>
+</p:sld>
+</file>
+
+<file path=ppt/slides/slide7.xml><?xml version="1.0" encoding="utf-8"?>
+<p:sld xmlns:a="http://schemas.openxmlformats.org/drawingml/2006/main" xmlns:r="http://schemas.openxmlformats.org/officeDocument/2006/relationships" xmlns:p="http://schemas.openxmlformats.org/presentationml/2006/main">
+  <p:cSld>
+    <p:spTree>
+      <p:nvGrpSpPr>
+        <p:cNvPr id="1" name=""/>
+        <p:cNvGrpSpPr/>
+        <p:nvPr/>
+      </p:nvGrpSpPr>
+      <p:grpSpPr>
+        <a:xfrm>
+          <a:off x="0" y="0"/>
+          <a:ext cx="0" cy="0"/>
+          <a:chOff x="0" y="0"/>
+          <a:chExt cx="0" cy="0"/>
+        </a:xfrm>
+      </p:grpSpPr>
+      <p:sp>
+        <p:nvSpPr>
+          <p:cNvPr id="2" name="Заголовок 1">
+            <a:extLst>
+              <a:ext uri="{FF2B5EF4-FFF2-40B4-BE49-F238E27FC236}">
+                <a16:creationId xmlns:a16="http://schemas.microsoft.com/office/drawing/2014/main" id="{77833B00-89B1-3101-0122-5593084ED451}"/>
+              </a:ext>
+            </a:extLst>
+          </p:cNvPr>
+          <p:cNvSpPr>
+            <a:spLocks noGrp="1"/>
+          </p:cNvSpPr>
+          <p:nvPr>
+            <p:ph type="title"/>
+          </p:nvPr>
+        </p:nvSpPr>
+        <p:spPr/>
+        <p:txBody>
+          <a:bodyPr/>
+          <a:lstStyle/>
+          <a:p>
+            <a:r>
+              <a:rPr lang="ru-RU" dirty="0"/>
+              <a:t>Ключевые показатели</a:t>
+            </a:r>
+          </a:p>
+        </p:txBody>
+      </p:sp>
+      <p:sp>
+        <p:nvSpPr>
+          <p:cNvPr id="3" name="Объект 2">
+            <a:extLst>
+              <a:ext uri="{FF2B5EF4-FFF2-40B4-BE49-F238E27FC236}">
+                <a16:creationId xmlns:a16="http://schemas.microsoft.com/office/drawing/2014/main" id="{82EAED5A-AD1F-5818-B880-010E0DA174FD}"/>
+              </a:ext>
+            </a:extLst>
+          </p:cNvPr>
+          <p:cNvSpPr>
+            <a:spLocks noGrp="1"/>
+          </p:cNvSpPr>
+          <p:nvPr>
+            <p:ph idx="1"/>
+          </p:nvPr>
+        </p:nvSpPr>
+        <p:spPr/>
+        <p:txBody>
+          <a:bodyPr/>
+          <a:lstStyle/>
+          <a:p>
+            <a:pPr algn="l">
+              <a:lnSpc>
+                <a:spcPts val="2143"/>
+              </a:lnSpc>
+              <a:spcBef>
+                <a:spcPts val="1029"/>
+              </a:spcBef>
+              <a:spcAft>
+                <a:spcPts val="1029"/>
+              </a:spcAft>
+              <a:buFont typeface="Arial" panose="020B0604020202020204" pitchFamily="34" charset="0"/>
+              <a:buChar char="•"/>
+            </a:pPr>
+            <a:r>
+              <a:rPr lang="ru-RU" b="1" i="0" dirty="0">
+                <a:solidFill>
+                  <a:srgbClr val="404040"/>
+                </a:solidFill>
+                <a:effectLst/>
+                <a:latin typeface="Times New Roman" panose="02020603050405020304" pitchFamily="18" charset="0"/>
+                <a:cs typeface="Times New Roman" panose="02020603050405020304" pitchFamily="18" charset="0"/>
+              </a:rPr>
+              <a:t>Производительность</a:t>
+            </a:r>
+            <a:r>
+              <a:rPr lang="ru-RU" b="0" i="0" dirty="0">
+                <a:solidFill>
+                  <a:srgbClr val="404040"/>
+                </a:solidFill>
+                <a:effectLst/>
+                <a:latin typeface="Times New Roman" panose="02020603050405020304" pitchFamily="18" charset="0"/>
+                <a:cs typeface="Times New Roman" panose="02020603050405020304" pitchFamily="18" charset="0"/>
+              </a:rPr>
+              <a:t>: 100 RPS на API</a:t>
+            </a:r>
+          </a:p>
+          <a:p>
+            <a:pPr algn="l">
+              <a:lnSpc>
+                <a:spcPts val="2143"/>
+              </a:lnSpc>
+              <a:spcBef>
+                <a:spcPts val="300"/>
+              </a:spcBef>
+              <a:spcAft>
+                <a:spcPts val="1029"/>
+              </a:spcAft>
+              <a:buFont typeface="Arial" panose="020B0604020202020204" pitchFamily="34" charset="0"/>
+              <a:buChar char="•"/>
+            </a:pPr>
+            <a:r>
+              <a:rPr lang="ru-RU" b="1" i="0" dirty="0">
+                <a:solidFill>
+                  <a:srgbClr val="404040"/>
+                </a:solidFill>
+                <a:effectLst/>
+                <a:latin typeface="Times New Roman" panose="02020603050405020304" pitchFamily="18" charset="0"/>
+                <a:cs typeface="Times New Roman" panose="02020603050405020304" pitchFamily="18" charset="0"/>
+              </a:rPr>
+              <a:t>Надежность</a:t>
+            </a:r>
+            <a:r>
+              <a:rPr lang="ru-RU" b="0" i="0" dirty="0">
+                <a:solidFill>
+                  <a:srgbClr val="404040"/>
+                </a:solidFill>
+                <a:effectLst/>
+                <a:latin typeface="Times New Roman" panose="02020603050405020304" pitchFamily="18" charset="0"/>
+                <a:cs typeface="Times New Roman" panose="02020603050405020304" pitchFamily="18" charset="0"/>
+              </a:rPr>
+              <a:t>: 99.95% </a:t>
+            </a:r>
+            <a:r>
+              <a:rPr lang="ru-RU" b="0" i="0" dirty="0" err="1">
+                <a:solidFill>
+                  <a:srgbClr val="404040"/>
+                </a:solidFill>
+                <a:effectLst/>
+                <a:latin typeface="Times New Roman" panose="02020603050405020304" pitchFamily="18" charset="0"/>
+                <a:cs typeface="Times New Roman" panose="02020603050405020304" pitchFamily="18" charset="0"/>
+              </a:rPr>
+              <a:t>uptime</a:t>
+            </a:r>
+            <a:endParaRPr lang="ru-RU" b="0" i="0" dirty="0">
+              <a:solidFill>
+                <a:srgbClr val="404040"/>
+              </a:solidFill>
+              <a:effectLst/>
+              <a:latin typeface="Times New Roman" panose="02020603050405020304" pitchFamily="18" charset="0"/>
+              <a:cs typeface="Times New Roman" panose="02020603050405020304" pitchFamily="18" charset="0"/>
+            </a:endParaRPr>
+          </a:p>
+          <a:p>
+            <a:pPr algn="l">
+              <a:lnSpc>
+                <a:spcPts val="2143"/>
+              </a:lnSpc>
+              <a:spcBef>
+                <a:spcPts val="300"/>
+              </a:spcBef>
+              <a:spcAft>
+                <a:spcPts val="1029"/>
+              </a:spcAft>
+              <a:buFont typeface="Arial" panose="020B0604020202020204" pitchFamily="34" charset="0"/>
+              <a:buChar char="•"/>
+            </a:pPr>
+            <a:r>
+              <a:rPr lang="ru-RU" b="1" i="0" dirty="0">
+                <a:solidFill>
+                  <a:srgbClr val="404040"/>
+                </a:solidFill>
+                <a:effectLst/>
+                <a:latin typeface="Times New Roman" panose="02020603050405020304" pitchFamily="18" charset="0"/>
+                <a:cs typeface="Times New Roman" panose="02020603050405020304" pitchFamily="18" charset="0"/>
+              </a:rPr>
+              <a:t>Безопасность</a:t>
+            </a:r>
+            <a:r>
+              <a:rPr lang="ru-RU" b="0" i="0" dirty="0">
+                <a:solidFill>
+                  <a:srgbClr val="404040"/>
+                </a:solidFill>
+                <a:effectLst/>
+                <a:latin typeface="Times New Roman" panose="02020603050405020304" pitchFamily="18" charset="0"/>
+                <a:cs typeface="Times New Roman" panose="02020603050405020304" pitchFamily="18" charset="0"/>
+              </a:rPr>
+              <a:t>: TLS 1.3, OAuth2</a:t>
+            </a:r>
+          </a:p>
+          <a:p>
+            <a:pPr algn="l">
+              <a:lnSpc>
+                <a:spcPts val="2143"/>
+              </a:lnSpc>
+              <a:spcBef>
+                <a:spcPts val="300"/>
+              </a:spcBef>
+              <a:spcAft>
+                <a:spcPts val="1029"/>
+              </a:spcAft>
+              <a:buFont typeface="Arial" panose="020B0604020202020204" pitchFamily="34" charset="0"/>
+              <a:buChar char="•"/>
+            </a:pPr>
+            <a:r>
+              <a:rPr lang="ru-RU" b="1" i="0" dirty="0">
+                <a:solidFill>
+                  <a:srgbClr val="404040"/>
+                </a:solidFill>
+                <a:effectLst/>
+                <a:latin typeface="Times New Roman" panose="02020603050405020304" pitchFamily="18" charset="0"/>
+                <a:cs typeface="Times New Roman" panose="02020603050405020304" pitchFamily="18" charset="0"/>
+              </a:rPr>
+              <a:t>Масштабируемость</a:t>
+            </a:r>
+            <a:r>
+              <a:rPr lang="ru-RU" b="0" i="0" dirty="0">
+                <a:solidFill>
+                  <a:srgbClr val="404040"/>
+                </a:solidFill>
+                <a:effectLst/>
+                <a:latin typeface="Times New Roman" panose="02020603050405020304" pitchFamily="18" charset="0"/>
+                <a:cs typeface="Times New Roman" panose="02020603050405020304" pitchFamily="18" charset="0"/>
+              </a:rPr>
+              <a:t>: Горизонтальное масштабирование сервисов</a:t>
+            </a:r>
+          </a:p>
+          <a:p>
+            <a:pPr algn="l">
+              <a:lnSpc>
+                <a:spcPts val="2143"/>
+              </a:lnSpc>
+              <a:spcBef>
+                <a:spcPts val="300"/>
+              </a:spcBef>
+              <a:spcAft>
+                <a:spcPts val="1029"/>
+              </a:spcAft>
+              <a:buFont typeface="Arial" panose="020B0604020202020204" pitchFamily="34" charset="0"/>
+              <a:buChar char="•"/>
+            </a:pPr>
+            <a:r>
+              <a:rPr lang="ru-RU" b="1" i="0" dirty="0">
+                <a:solidFill>
+                  <a:srgbClr val="404040"/>
+                </a:solidFill>
+                <a:effectLst/>
+                <a:latin typeface="Times New Roman" panose="02020603050405020304" pitchFamily="18" charset="0"/>
+                <a:cs typeface="Times New Roman" panose="02020603050405020304" pitchFamily="18" charset="0"/>
+              </a:rPr>
+              <a:t>Расширяемость</a:t>
+            </a:r>
+            <a:r>
+              <a:rPr lang="ru-RU" b="0" i="0" dirty="0">
+                <a:solidFill>
+                  <a:srgbClr val="404040"/>
+                </a:solidFill>
+                <a:effectLst/>
+                <a:latin typeface="Times New Roman" panose="02020603050405020304" pitchFamily="18" charset="0"/>
+                <a:cs typeface="Times New Roman" panose="02020603050405020304" pitchFamily="18" charset="0"/>
+              </a:rPr>
+              <a:t>: </a:t>
+            </a:r>
+            <a:r>
+              <a:rPr lang="ru-RU" b="0" i="0" dirty="0" err="1">
+                <a:solidFill>
+                  <a:srgbClr val="404040"/>
+                </a:solidFill>
+                <a:effectLst/>
+                <a:latin typeface="Times New Roman" panose="02020603050405020304" pitchFamily="18" charset="0"/>
+                <a:cs typeface="Times New Roman" panose="02020603050405020304" pitchFamily="18" charset="0"/>
+              </a:rPr>
+              <a:t>Микросервисная</a:t>
+            </a:r>
+            <a:r>
+              <a:rPr lang="ru-RU" b="0" i="0" dirty="0">
+                <a:solidFill>
+                  <a:srgbClr val="404040"/>
+                </a:solidFill>
+                <a:effectLst/>
+                <a:latin typeface="Times New Roman" panose="02020603050405020304" pitchFamily="18" charset="0"/>
+                <a:cs typeface="Times New Roman" panose="02020603050405020304" pitchFamily="18" charset="0"/>
+              </a:rPr>
+              <a:t> архитектура</a:t>
+            </a:r>
+          </a:p>
+          <a:p>
+            <a:endParaRPr lang="ru-RU" dirty="0">
+              <a:latin typeface="Times New Roman" panose="02020603050405020304" pitchFamily="18" charset="0"/>
+              <a:cs typeface="Times New Roman" panose="02020603050405020304" pitchFamily="18" charset="0"/>
+            </a:endParaRPr>
+          </a:p>
+        </p:txBody>
+      </p:sp>
+    </p:spTree>
+    <p:extLst>
+      <p:ext uri="{BB962C8B-B14F-4D97-AF65-F5344CB8AC3E}">
+        <p14:creationId xmlns:p14="http://schemas.microsoft.com/office/powerpoint/2010/main" val="1744626554"/>
+      </p:ext>
+    </p:extLst>
+  </p:cSld>
+  <p:clrMapOvr>
+    <a:masterClrMapping/>
+  </p:clrMapOvr>
+</p:sld>
+</file>
+
+<file path=ppt/slides/slide8.xml><?xml version="1.0" encoding="utf-8"?>
+<p:sld xmlns:a="http://schemas.openxmlformats.org/drawingml/2006/main" xmlns:r="http://schemas.openxmlformats.org/officeDocument/2006/relationships" xmlns:p="http://schemas.openxmlformats.org/presentationml/2006/main">
+  <p:cSld>
+    <p:spTree>
+      <p:nvGrpSpPr>
+        <p:cNvPr id="1" name=""/>
+        <p:cNvGrpSpPr/>
+        <p:nvPr/>
+      </p:nvGrpSpPr>
+      <p:grpSpPr>
+        <a:xfrm>
+          <a:off x="0" y="0"/>
+          <a:ext cx="0" cy="0"/>
+          <a:chOff x="0" y="0"/>
+          <a:chExt cx="0" cy="0"/>
+        </a:xfrm>
+      </p:grpSpPr>
+      <p:sp>
+        <p:nvSpPr>
+          <p:cNvPr id="2" name="Заголовок 1">
+            <a:extLst>
+              <a:ext uri="{FF2B5EF4-FFF2-40B4-BE49-F238E27FC236}">
+                <a16:creationId xmlns:a16="http://schemas.microsoft.com/office/drawing/2014/main" id="{32F37BC9-E29A-F7C8-B9DD-9E00216BC86C}"/>
+              </a:ext>
+            </a:extLst>
+          </p:cNvPr>
+          <p:cNvSpPr>
+            <a:spLocks noGrp="1"/>
+          </p:cNvSpPr>
+          <p:nvPr>
+            <p:ph type="title"/>
+          </p:nvPr>
+        </p:nvSpPr>
+        <p:spPr/>
+        <p:txBody>
+          <a:bodyPr/>
+          <a:lstStyle/>
+          <a:p>
+            <a:r>
+              <a:rPr lang="ru-RU" dirty="0"/>
+              <a:t>Обоснование выбора</a:t>
+            </a:r>
+          </a:p>
+        </p:txBody>
+      </p:sp>
+      <p:sp>
+        <p:nvSpPr>
+          <p:cNvPr id="3" name="Объект 2">
+            <a:extLst>
+              <a:ext uri="{FF2B5EF4-FFF2-40B4-BE49-F238E27FC236}">
+                <a16:creationId xmlns:a16="http://schemas.microsoft.com/office/drawing/2014/main" id="{484D9477-90C8-18CE-3DCD-FD5DA341598D}"/>
+              </a:ext>
+            </a:extLst>
+          </p:cNvPr>
+          <p:cNvSpPr>
+            <a:spLocks noGrp="1"/>
+          </p:cNvSpPr>
+          <p:nvPr>
+            <p:ph idx="1"/>
+          </p:nvPr>
+        </p:nvSpPr>
+        <p:spPr/>
+        <p:txBody>
+          <a:bodyPr/>
+          <a:lstStyle/>
+          <a:p>
+            <a:pPr algn="l">
+              <a:lnSpc>
+                <a:spcPts val="2143"/>
+              </a:lnSpc>
+              <a:spcBef>
+                <a:spcPts val="1029"/>
+              </a:spcBef>
+              <a:spcAft>
+                <a:spcPts val="1029"/>
+              </a:spcAft>
+              <a:buFont typeface="Arial" panose="020B0604020202020204" pitchFamily="34" charset="0"/>
+              <a:buChar char="•"/>
+            </a:pPr>
+            <a:r>
+              <a:rPr lang="ru-RU" b="0" i="0" dirty="0">
+                <a:solidFill>
+                  <a:srgbClr val="404040"/>
+                </a:solidFill>
+                <a:effectLst/>
+                <a:latin typeface="Times New Roman" panose="02020603050405020304" pitchFamily="18" charset="0"/>
+                <a:cs typeface="Times New Roman" panose="02020603050405020304" pitchFamily="18" charset="0"/>
+              </a:rPr>
+              <a:t>Асинхронная обработка новостей через очереди для устойчивости к пикам</a:t>
+            </a:r>
+          </a:p>
+          <a:p>
+            <a:pPr algn="l">
+              <a:lnSpc>
+                <a:spcPts val="2143"/>
+              </a:lnSpc>
+              <a:spcBef>
+                <a:spcPts val="300"/>
+              </a:spcBef>
+              <a:spcAft>
+                <a:spcPts val="1029"/>
+              </a:spcAft>
+              <a:buFont typeface="Arial" panose="020B0604020202020204" pitchFamily="34" charset="0"/>
+              <a:buChar char="•"/>
+            </a:pPr>
+            <a:r>
+              <a:rPr lang="ru-RU" b="0" i="0" dirty="0">
+                <a:solidFill>
+                  <a:srgbClr val="404040"/>
+                </a:solidFill>
+                <a:effectLst/>
+                <a:latin typeface="Times New Roman" panose="02020603050405020304" pitchFamily="18" charset="0"/>
+                <a:cs typeface="Times New Roman" panose="02020603050405020304" pitchFamily="18" charset="0"/>
+              </a:rPr>
+              <a:t>Разделение сервисов по зонам ответственности</a:t>
+            </a:r>
+          </a:p>
+          <a:p>
+            <a:pPr algn="l">
+              <a:lnSpc>
+                <a:spcPts val="2143"/>
+              </a:lnSpc>
+              <a:spcBef>
+                <a:spcPts val="300"/>
+              </a:spcBef>
+              <a:spcAft>
+                <a:spcPts val="1029"/>
+              </a:spcAft>
+              <a:buFont typeface="Arial" panose="020B0604020202020204" pitchFamily="34" charset="0"/>
+              <a:buChar char="•"/>
+            </a:pPr>
+            <a:r>
+              <a:rPr lang="ru-RU" b="0" i="0" dirty="0">
+                <a:solidFill>
+                  <a:srgbClr val="404040"/>
+                </a:solidFill>
+                <a:effectLst/>
+                <a:latin typeface="Times New Roman" panose="02020603050405020304" pitchFamily="18" charset="0"/>
+                <a:cs typeface="Times New Roman" panose="02020603050405020304" pitchFamily="18" charset="0"/>
+              </a:rPr>
+              <a:t>Использование проверенных OSS-решений (</a:t>
+            </a:r>
+            <a:r>
+              <a:rPr lang="ru-RU" b="0" i="0" dirty="0" err="1">
+                <a:solidFill>
+                  <a:srgbClr val="404040"/>
+                </a:solidFill>
+                <a:effectLst/>
+                <a:latin typeface="Times New Roman" panose="02020603050405020304" pitchFamily="18" charset="0"/>
+                <a:cs typeface="Times New Roman" panose="02020603050405020304" pitchFamily="18" charset="0"/>
+              </a:rPr>
+              <a:t>Natasha</a:t>
+            </a:r>
+            <a:r>
+              <a:rPr lang="ru-RU" b="0" i="0" dirty="0">
+                <a:solidFill>
+                  <a:srgbClr val="404040"/>
+                </a:solidFill>
+                <a:effectLst/>
+                <a:latin typeface="Times New Roman" panose="02020603050405020304" pitchFamily="18" charset="0"/>
+                <a:cs typeface="Times New Roman" panose="02020603050405020304" pitchFamily="18" charset="0"/>
+              </a:rPr>
+              <a:t>, </a:t>
+            </a:r>
+            <a:r>
+              <a:rPr lang="ru-RU" b="0" i="0" dirty="0" err="1">
+                <a:solidFill>
+                  <a:srgbClr val="404040"/>
+                </a:solidFill>
+                <a:effectLst/>
+                <a:latin typeface="Times New Roman" panose="02020603050405020304" pitchFamily="18" charset="0"/>
+                <a:cs typeface="Times New Roman" panose="02020603050405020304" pitchFamily="18" charset="0"/>
+              </a:rPr>
+              <a:t>Scrapy</a:t>
+            </a:r>
+            <a:r>
+              <a:rPr lang="ru-RU" b="0" i="0" dirty="0">
+                <a:solidFill>
+                  <a:srgbClr val="404040"/>
+                </a:solidFill>
+                <a:effectLst/>
+                <a:latin typeface="Times New Roman" panose="02020603050405020304" pitchFamily="18" charset="0"/>
+                <a:cs typeface="Times New Roman" panose="02020603050405020304" pitchFamily="18" charset="0"/>
+              </a:rPr>
+              <a:t>)</a:t>
+            </a:r>
+          </a:p>
+          <a:p>
+            <a:pPr algn="l">
+              <a:lnSpc>
+                <a:spcPts val="2143"/>
+              </a:lnSpc>
+              <a:spcBef>
+                <a:spcPts val="300"/>
+              </a:spcBef>
+              <a:spcAft>
+                <a:spcPts val="1029"/>
+              </a:spcAft>
+              <a:buFont typeface="Arial" panose="020B0604020202020204" pitchFamily="34" charset="0"/>
+              <a:buChar char="•"/>
+            </a:pPr>
+            <a:r>
+              <a:rPr lang="ru-RU" b="0" i="0" dirty="0">
+                <a:solidFill>
+                  <a:srgbClr val="404040"/>
+                </a:solidFill>
+                <a:effectLst/>
+                <a:latin typeface="Times New Roman" panose="02020603050405020304" pitchFamily="18" charset="0"/>
+                <a:cs typeface="Times New Roman" panose="02020603050405020304" pitchFamily="18" charset="0"/>
+              </a:rPr>
+              <a:t>Гибкость для добавления новых источников</a:t>
+            </a:r>
+          </a:p>
+          <a:p>
+            <a:endParaRPr lang="ru-RU" dirty="0">
+              <a:latin typeface="Times New Roman" panose="02020603050405020304" pitchFamily="18" charset="0"/>
+              <a:cs typeface="Times New Roman" panose="02020603050405020304" pitchFamily="18" charset="0"/>
+            </a:endParaRPr>
+          </a:p>
+        </p:txBody>
+      </p:sp>
+    </p:spTree>
+    <p:extLst>
+      <p:ext uri="{BB962C8B-B14F-4D97-AF65-F5344CB8AC3E}">
+        <p14:creationId xmlns:p14="http://schemas.microsoft.com/office/powerpoint/2010/main" val="3154011076"/>
       </p:ext>
     </p:extLst>
   </p:cSld>

</xml_diff>